<commit_message>
Updates on the poster
</commit_message>
<xml_diff>
--- a/IMVC_Poster.pptx
+++ b/IMVC_Poster.pptx
@@ -104,6 +104,11 @@
       </a:defRPr>
     </a:lvl9pPr>
   </p:defaultTextStyle>
+  <p:extLst>
+    <p:ext uri="{EFAFB233-063F-42B5-8137-9DF3F51BA10A}">
+      <p15:sldGuideLst xmlns:p15="http://schemas.microsoft.com/office/powerpoint/2012/main"/>
+    </p:ext>
+  </p:extLst>
 </p:presentation>
 </file>
 
@@ -238,7 +243,7 @@
           <a:p>
             <a:fld id="{5E80B7E4-612C-CC4A-A72E-1A997F7627B3}" type="datetimeFigureOut">
               <a:rPr lang="en-US" smtClean="0"/>
-              <a:t>2/27/18</a:t>
+              <a:t>3/4/18</a:t>
             </a:fld>
             <a:endParaRPr lang="en-US"/>
           </a:p>
@@ -408,7 +413,7 @@
           <a:p>
             <a:fld id="{5E80B7E4-612C-CC4A-A72E-1A997F7627B3}" type="datetimeFigureOut">
               <a:rPr lang="en-US" smtClean="0"/>
-              <a:t>2/27/18</a:t>
+              <a:t>3/4/18</a:t>
             </a:fld>
             <a:endParaRPr lang="en-US"/>
           </a:p>
@@ -588,7 +593,7 @@
           <a:p>
             <a:fld id="{5E80B7E4-612C-CC4A-A72E-1A997F7627B3}" type="datetimeFigureOut">
               <a:rPr lang="en-US" smtClean="0"/>
-              <a:t>2/27/18</a:t>
+              <a:t>3/4/18</a:t>
             </a:fld>
             <a:endParaRPr lang="en-US"/>
           </a:p>
@@ -758,7 +763,7 @@
           <a:p>
             <a:fld id="{5E80B7E4-612C-CC4A-A72E-1A997F7627B3}" type="datetimeFigureOut">
               <a:rPr lang="en-US" smtClean="0"/>
-              <a:t>2/27/18</a:t>
+              <a:t>3/4/18</a:t>
             </a:fld>
             <a:endParaRPr lang="en-US"/>
           </a:p>
@@ -1004,7 +1009,7 @@
           <a:p>
             <a:fld id="{5E80B7E4-612C-CC4A-A72E-1A997F7627B3}" type="datetimeFigureOut">
               <a:rPr lang="en-US" smtClean="0"/>
-              <a:t>2/27/18</a:t>
+              <a:t>3/4/18</a:t>
             </a:fld>
             <a:endParaRPr lang="en-US"/>
           </a:p>
@@ -1236,7 +1241,7 @@
           <a:p>
             <a:fld id="{5E80B7E4-612C-CC4A-A72E-1A997F7627B3}" type="datetimeFigureOut">
               <a:rPr lang="en-US" smtClean="0"/>
-              <a:t>2/27/18</a:t>
+              <a:t>3/4/18</a:t>
             </a:fld>
             <a:endParaRPr lang="en-US"/>
           </a:p>
@@ -1603,7 +1608,7 @@
           <a:p>
             <a:fld id="{5E80B7E4-612C-CC4A-A72E-1A997F7627B3}" type="datetimeFigureOut">
               <a:rPr lang="en-US" smtClean="0"/>
-              <a:t>2/27/18</a:t>
+              <a:t>3/4/18</a:t>
             </a:fld>
             <a:endParaRPr lang="en-US"/>
           </a:p>
@@ -1721,7 +1726,7 @@
           <a:p>
             <a:fld id="{5E80B7E4-612C-CC4A-A72E-1A997F7627B3}" type="datetimeFigureOut">
               <a:rPr lang="en-US" smtClean="0"/>
-              <a:t>2/27/18</a:t>
+              <a:t>3/4/18</a:t>
             </a:fld>
             <a:endParaRPr lang="en-US"/>
           </a:p>
@@ -1816,7 +1821,7 @@
           <a:p>
             <a:fld id="{5E80B7E4-612C-CC4A-A72E-1A997F7627B3}" type="datetimeFigureOut">
               <a:rPr lang="en-US" smtClean="0"/>
-              <a:t>2/27/18</a:t>
+              <a:t>3/4/18</a:t>
             </a:fld>
             <a:endParaRPr lang="en-US"/>
           </a:p>
@@ -2093,7 +2098,7 @@
           <a:p>
             <a:fld id="{5E80B7E4-612C-CC4A-A72E-1A997F7627B3}" type="datetimeFigureOut">
               <a:rPr lang="en-US" smtClean="0"/>
-              <a:t>2/27/18</a:t>
+              <a:t>3/4/18</a:t>
             </a:fld>
             <a:endParaRPr lang="en-US"/>
           </a:p>
@@ -2346,7 +2351,7 @@
           <a:p>
             <a:fld id="{5E80B7E4-612C-CC4A-A72E-1A997F7627B3}" type="datetimeFigureOut">
               <a:rPr lang="en-US" smtClean="0"/>
-              <a:t>2/27/18</a:t>
+              <a:t>3/4/18</a:t>
             </a:fld>
             <a:endParaRPr lang="en-US"/>
           </a:p>
@@ -2559,7 +2564,7 @@
           <a:p>
             <a:fld id="{5E80B7E4-612C-CC4A-A72E-1A997F7627B3}" type="datetimeFigureOut">
               <a:rPr lang="en-US" smtClean="0"/>
-              <a:t>2/27/18</a:t>
+              <a:t>3/4/18</a:t>
             </a:fld>
             <a:endParaRPr lang="en-US"/>
           </a:p>
@@ -2973,7 +2978,7 @@
         <p:spPr>
           <a:xfrm>
             <a:off x="5854842" y="789061"/>
-            <a:ext cx="20924016" cy="3893374"/>
+            <a:ext cx="20924016" cy="5740033"/>
           </a:xfrm>
           <a:prstGeom prst="rect">
             <a:avLst/>
@@ -2988,9 +2993,9 @@
           <a:p>
             <a:pPr algn="ctr"/>
             <a:r>
-              <a:rPr lang="en-US" sz="13900" dirty="0" smtClean="0">
-                <a:solidFill>
-                  <a:schemeClr val="accent1">
+              <a:rPr lang="en-US" sz="13900" dirty="0" err="1" smtClean="0">
+                <a:solidFill>
+                  <a:schemeClr val="accent5">
                     <a:lumMod val="50000"/>
                   </a:schemeClr>
                 </a:solidFill>
@@ -3000,13 +3005,23 @@
               </a:rPr>
               <a:t>AirDrums</a:t>
             </a:r>
+            <a:endParaRPr lang="en-US" sz="13900" dirty="0" smtClean="0">
+              <a:solidFill>
+                <a:schemeClr val="accent5">
+                  <a:lumMod val="50000"/>
+                </a:schemeClr>
+              </a:solidFill>
+              <a:latin typeface="Marker Felt Thin" charset="0"/>
+              <a:ea typeface="Marker Felt Thin" charset="0"/>
+              <a:cs typeface="Marker Felt Thin" charset="0"/>
+            </a:endParaRPr>
           </a:p>
           <a:p>
             <a:pPr algn="ctr"/>
             <a:r>
-              <a:rPr lang="en-US" sz="5400" dirty="0" err="1" smtClean="0">
-                <a:solidFill>
-                  <a:schemeClr val="accent1">
+              <a:rPr lang="en-US" sz="6600" b="1" dirty="0">
+                <a:solidFill>
+                  <a:schemeClr val="accent5">
                     <a:lumMod val="50000"/>
                   </a:schemeClr>
                 </a:solidFill>
@@ -3014,12 +3029,12 @@
                 <a:ea typeface="Avenir Book" charset="0"/>
                 <a:cs typeface="Avenir Book" charset="0"/>
               </a:rPr>
-              <a:t>Roi</a:t>
-            </a:r>
-            <a:r>
-              <a:rPr lang="en-US" sz="5400" dirty="0" smtClean="0">
-                <a:solidFill>
-                  <a:schemeClr val="accent1">
+              <a:t> </a:t>
+            </a:r>
+            <a:r>
+              <a:rPr lang="en-US" sz="6600" b="1" dirty="0" smtClean="0">
+                <a:solidFill>
+                  <a:schemeClr val="accent5">
                     <a:lumMod val="50000"/>
                   </a:schemeClr>
                 </a:solidFill>
@@ -3027,12 +3042,12 @@
                 <a:ea typeface="Avenir Book" charset="0"/>
                 <a:cs typeface="Avenir Book" charset="0"/>
               </a:rPr>
-              <a:t> Hirsch, Ori </a:t>
-            </a:r>
-            <a:r>
-              <a:rPr lang="en-US" sz="5400" dirty="0" err="1" smtClean="0">
-                <a:solidFill>
-                  <a:schemeClr val="accent1">
+              <a:t>Virtual </a:t>
+            </a:r>
+            <a:r>
+              <a:rPr lang="en-US" sz="6600" b="1" dirty="0">
+                <a:solidFill>
+                  <a:schemeClr val="accent5">
                     <a:lumMod val="50000"/>
                   </a:schemeClr>
                 </a:solidFill>
@@ -3040,12 +3055,12 @@
                 <a:ea typeface="Avenir Book" charset="0"/>
                 <a:cs typeface="Avenir Book" charset="0"/>
               </a:rPr>
-              <a:t>Chayoot</a:t>
-            </a:r>
-            <a:r>
-              <a:rPr lang="en-US" sz="5400" dirty="0" smtClean="0">
-                <a:solidFill>
-                  <a:schemeClr val="accent1">
+              <a:t>drum kit using stereo </a:t>
+            </a:r>
+            <a:r>
+              <a:rPr lang="en-US" sz="6600" b="1" dirty="0" smtClean="0">
+                <a:solidFill>
+                  <a:schemeClr val="accent5">
                     <a:lumMod val="50000"/>
                   </a:schemeClr>
                 </a:solidFill>
@@ -3053,12 +3068,15 @@
                 <a:ea typeface="Avenir Book" charset="0"/>
                 <a:cs typeface="Avenir Book" charset="0"/>
               </a:rPr>
-              <a:t>, Gal </a:t>
-            </a:r>
-            <a:r>
-              <a:rPr lang="en-US" sz="5400" dirty="0" err="1" smtClean="0">
-                <a:solidFill>
-                  <a:schemeClr val="accent1">
+              <a:t>imaging</a:t>
+            </a:r>
+          </a:p>
+          <a:p>
+            <a:pPr algn="ctr"/>
+            <a:r>
+              <a:rPr lang="en-US" sz="5400" dirty="0">
+                <a:solidFill>
+                  <a:schemeClr val="accent5">
                     <a:lumMod val="50000"/>
                   </a:schemeClr>
                 </a:solidFill>
@@ -3066,50 +3084,11 @@
                 <a:ea typeface="Avenir Book" charset="0"/>
                 <a:cs typeface="Avenir Book" charset="0"/>
               </a:rPr>
-              <a:t>Lifshitz</a:t>
-            </a:r>
-            <a:r>
-              <a:rPr lang="en-US" sz="5400" dirty="0" smtClean="0">
-                <a:solidFill>
-                  <a:schemeClr val="accent1">
-                    <a:lumMod val="50000"/>
-                  </a:schemeClr>
-                </a:solidFill>
-                <a:latin typeface="Avenir Book" charset="0"/>
-                <a:ea typeface="Avenir Book" charset="0"/>
-                <a:cs typeface="Avenir Book" charset="0"/>
-              </a:rPr>
-              <a:t>, </a:t>
-            </a:r>
-            <a:r>
-              <a:rPr lang="en-US" sz="5400" dirty="0" err="1" smtClean="0">
-                <a:solidFill>
-                  <a:schemeClr val="accent1">
-                    <a:lumMod val="50000"/>
-                  </a:schemeClr>
-                </a:solidFill>
-                <a:latin typeface="Avenir Book" charset="0"/>
-                <a:ea typeface="Avenir Book" charset="0"/>
-                <a:cs typeface="Avenir Book" charset="0"/>
-              </a:rPr>
-              <a:t>Asaf</a:t>
-            </a:r>
-            <a:r>
-              <a:rPr lang="en-US" sz="5400" dirty="0" smtClean="0">
-                <a:solidFill>
-                  <a:schemeClr val="accent1">
-                    <a:lumMod val="50000"/>
-                  </a:schemeClr>
-                </a:solidFill>
-                <a:latin typeface="Avenir Book" charset="0"/>
-                <a:ea typeface="Avenir Book" charset="0"/>
-                <a:cs typeface="Avenir Book" charset="0"/>
-              </a:rPr>
-              <a:t> Manor</a:t>
-            </a:r>
-            <a:endParaRPr lang="he-IL" sz="5400" dirty="0" smtClean="0">
+              <a:t> </a:t>
+            </a:r>
+            <a:endParaRPr lang="en-US" sz="5400" dirty="0">
               <a:solidFill>
-                <a:schemeClr val="accent1">
+                <a:schemeClr val="accent5">
                   <a:lumMod val="50000"/>
                 </a:schemeClr>
               </a:solidFill>
@@ -3121,9 +3100,9 @@
           <a:p>
             <a:pPr algn="ctr"/>
             <a:r>
-              <a:rPr lang="en-US" sz="5400" dirty="0" smtClean="0">
-                <a:solidFill>
-                  <a:schemeClr val="accent1">
+              <a:rPr lang="en-US" sz="5400" dirty="0" err="1" smtClean="0">
+                <a:solidFill>
+                  <a:schemeClr val="accent5">
                     <a:lumMod val="50000"/>
                   </a:schemeClr>
                 </a:solidFill>
@@ -3131,12 +3110,12 @@
                 <a:ea typeface="Avenir Book" charset="0"/>
                 <a:cs typeface="Avenir Book" charset="0"/>
               </a:rPr>
-              <a:t>Advisor: Dr. Tammy </a:t>
-            </a:r>
-            <a:r>
-              <a:rPr lang="en-US" sz="5400" dirty="0" err="1" smtClean="0">
-                <a:solidFill>
-                  <a:schemeClr val="accent1">
+              <a:t>Roi</a:t>
+            </a:r>
+            <a:r>
+              <a:rPr lang="en-US" sz="5400" dirty="0" smtClean="0">
+                <a:solidFill>
+                  <a:schemeClr val="accent5">
                     <a:lumMod val="50000"/>
                   </a:schemeClr>
                 </a:solidFill>
@@ -3144,12 +3123,12 @@
                 <a:ea typeface="Avenir Book" charset="0"/>
                 <a:cs typeface="Avenir Book" charset="0"/>
               </a:rPr>
-              <a:t>Riklin</a:t>
-            </a:r>
-            <a:r>
-              <a:rPr lang="en-US" sz="5400" dirty="0" smtClean="0">
-                <a:solidFill>
-                  <a:schemeClr val="accent1">
+              <a:t> Hirsch, Ori </a:t>
+            </a:r>
+            <a:r>
+              <a:rPr lang="en-US" sz="5400" dirty="0" err="1" smtClean="0">
+                <a:solidFill>
+                  <a:schemeClr val="accent5">
                     <a:lumMod val="50000"/>
                   </a:schemeClr>
                 </a:solidFill>
@@ -3157,12 +3136,12 @@
                 <a:ea typeface="Avenir Book" charset="0"/>
                 <a:cs typeface="Avenir Book" charset="0"/>
               </a:rPr>
-              <a:t> </a:t>
-            </a:r>
-            <a:r>
-              <a:rPr lang="en-US" sz="5400" dirty="0" err="1" smtClean="0">
-                <a:solidFill>
-                  <a:schemeClr val="accent1">
+              <a:t>Chayoot</a:t>
+            </a:r>
+            <a:r>
+              <a:rPr lang="en-US" sz="5400" dirty="0" smtClean="0">
+                <a:solidFill>
+                  <a:schemeClr val="accent5">
                     <a:lumMod val="50000"/>
                   </a:schemeClr>
                 </a:solidFill>
@@ -3170,11 +3149,63 @@
                 <a:ea typeface="Avenir Book" charset="0"/>
                 <a:cs typeface="Avenir Book" charset="0"/>
               </a:rPr>
-              <a:t>Raviv</a:t>
-            </a:r>
-            <a:endParaRPr lang="en-US" sz="5400" dirty="0">
+              <a:t>, Gal </a:t>
+            </a:r>
+            <a:r>
+              <a:rPr lang="en-US" sz="5400" dirty="0" err="1" smtClean="0">
+                <a:solidFill>
+                  <a:schemeClr val="accent5">
+                    <a:lumMod val="50000"/>
+                  </a:schemeClr>
+                </a:solidFill>
+                <a:latin typeface="Avenir Book" charset="0"/>
+                <a:ea typeface="Avenir Book" charset="0"/>
+                <a:cs typeface="Avenir Book" charset="0"/>
+              </a:rPr>
+              <a:t>Lifshitz</a:t>
+            </a:r>
+            <a:r>
+              <a:rPr lang="en-US" sz="5400" dirty="0" smtClean="0">
+                <a:solidFill>
+                  <a:schemeClr val="accent5">
+                    <a:lumMod val="50000"/>
+                  </a:schemeClr>
+                </a:solidFill>
+                <a:latin typeface="Avenir Book" charset="0"/>
+                <a:ea typeface="Avenir Book" charset="0"/>
+                <a:cs typeface="Avenir Book" charset="0"/>
+              </a:rPr>
+              <a:t>, </a:t>
+            </a:r>
+            <a:r>
+              <a:rPr lang="en-US" sz="5400" dirty="0" err="1" smtClean="0">
+                <a:solidFill>
+                  <a:schemeClr val="accent5">
+                    <a:lumMod val="50000"/>
+                  </a:schemeClr>
+                </a:solidFill>
+                <a:latin typeface="Avenir Book" charset="0"/>
+                <a:ea typeface="Avenir Book" charset="0"/>
+                <a:cs typeface="Avenir Book" charset="0"/>
+              </a:rPr>
+              <a:t>Asaf</a:t>
+            </a:r>
+            <a:r>
+              <a:rPr lang="en-US" sz="5400" dirty="0" smtClean="0">
+                <a:solidFill>
+                  <a:schemeClr val="accent5">
+                    <a:lumMod val="50000"/>
+                  </a:schemeClr>
+                </a:solidFill>
+                <a:latin typeface="Avenir Book" charset="0"/>
+                <a:ea typeface="Avenir Book" charset="0"/>
+                <a:cs typeface="Avenir Book" charset="0"/>
+              </a:rPr>
+              <a:t> Manor</a:t>
+            </a:r>
+            <a:endParaRPr lang="he-IL" sz="5400" dirty="0" smtClean="0">
               <a:solidFill>
-                <a:schemeClr val="accent1">
+                <a:schemeClr val="accent5">
                   <a:lumMod val="50000"/>
                 </a:schemeClr>
               </a:solidFill>
@@ -3183,6 +3214,71 @@
               <a:cs typeface="Avenir Book" charset="0"/>
             </a:endParaRPr>
           </a:p>
+          <a:p>
+            <a:pPr algn="ctr"/>
+            <a:r>
+              <a:rPr lang="en-US" sz="5400" dirty="0" smtClean="0">
+                <a:solidFill>
+                  <a:schemeClr val="accent5">
+                    <a:lumMod val="50000"/>
+                  </a:schemeClr>
+                </a:solidFill>
+                <a:latin typeface="Avenir Book" charset="0"/>
+                <a:ea typeface="Avenir Book" charset="0"/>
+                <a:cs typeface="Avenir Book" charset="0"/>
+              </a:rPr>
+              <a:t>Advisor: Dr. Tammy </a:t>
+            </a:r>
+            <a:r>
+              <a:rPr lang="en-US" sz="5400" dirty="0" err="1" smtClean="0">
+                <a:solidFill>
+                  <a:schemeClr val="accent5">
+                    <a:lumMod val="50000"/>
+                  </a:schemeClr>
+                </a:solidFill>
+                <a:latin typeface="Avenir Book" charset="0"/>
+                <a:ea typeface="Avenir Book" charset="0"/>
+                <a:cs typeface="Avenir Book" charset="0"/>
+              </a:rPr>
+              <a:t>Riklin</a:t>
+            </a:r>
+            <a:r>
+              <a:rPr lang="en-US" sz="5400" dirty="0" smtClean="0">
+                <a:solidFill>
+                  <a:schemeClr val="accent5">
+                    <a:lumMod val="50000"/>
+                  </a:schemeClr>
+                </a:solidFill>
+                <a:latin typeface="Avenir Book" charset="0"/>
+                <a:ea typeface="Avenir Book" charset="0"/>
+                <a:cs typeface="Avenir Book" charset="0"/>
+              </a:rPr>
+              <a:t> </a:t>
+            </a:r>
+            <a:r>
+              <a:rPr lang="en-US" sz="5400" dirty="0" err="1" smtClean="0">
+                <a:solidFill>
+                  <a:schemeClr val="accent5">
+                    <a:lumMod val="50000"/>
+                  </a:schemeClr>
+                </a:solidFill>
+                <a:latin typeface="Avenir Book" charset="0"/>
+                <a:ea typeface="Avenir Book" charset="0"/>
+                <a:cs typeface="Avenir Book" charset="0"/>
+              </a:rPr>
+              <a:t>Raviv</a:t>
+            </a:r>
+            <a:endParaRPr lang="en-US" sz="5400" dirty="0">
+              <a:solidFill>
+                <a:schemeClr val="accent5">
+                  <a:lumMod val="50000"/>
+                </a:schemeClr>
+              </a:solidFill>
+              <a:latin typeface="Avenir Book" charset="0"/>
+              <a:ea typeface="Avenir Book" charset="0"/>
+              <a:cs typeface="Avenir Book" charset="0"/>
+            </a:endParaRPr>
+          </a:p>
         </p:txBody>
       </p:sp>
       <p:sp>
@@ -3193,19 +3289,29 @@
         </p:nvSpPr>
         <p:spPr>
           <a:xfrm>
-            <a:off x="0" y="5791202"/>
-            <a:ext cx="17068800" cy="8969828"/>
+            <a:off x="0" y="6583682"/>
+            <a:ext cx="15849600" cy="8969828"/>
           </a:xfrm>
           <a:prstGeom prst="rect">
             <a:avLst/>
           </a:prstGeom>
-          <a:solidFill>
-            <a:schemeClr val="tx2">
-              <a:lumMod val="75000"/>
-            </a:schemeClr>
-          </a:solidFill>
-          <a:effectLst/>
+          <a:noFill/>
+          <a:ln w="76200"/>
         </p:spPr>
+        <p:style>
+          <a:lnRef idx="2">
+            <a:schemeClr val="accent1"/>
+          </a:lnRef>
+          <a:fillRef idx="1">
+            <a:schemeClr val="lt1"/>
+          </a:fillRef>
+          <a:effectRef idx="0">
+            <a:schemeClr val="accent1"/>
+          </a:effectRef>
+          <a:fontRef idx="minor">
+            <a:schemeClr val="dk1"/>
+          </a:fontRef>
+        </p:style>
         <p:txBody>
           <a:bodyPr wrap="square" lIns="360000" rIns="360000" numCol="1" spcCol="360000" rtlCol="0">
             <a:noAutofit/>
@@ -3218,9 +3324,11 @@
               </a:lnSpc>
             </a:pPr>
             <a:r>
-              <a:rPr lang="en-US" sz="5400" dirty="0" smtClean="0">
-                <a:solidFill>
-                  <a:schemeClr val="bg1"/>
+              <a:rPr lang="en-US" sz="5400" b="1" dirty="0" smtClean="0">
+                <a:solidFill>
+                  <a:schemeClr val="accent5">
+                    <a:lumMod val="50000"/>
+                  </a:schemeClr>
                 </a:solidFill>
                 <a:latin typeface="Avenir Light" charset="0"/>
                 <a:ea typeface="Avenir Light" charset="0"/>
@@ -3238,7 +3346,7 @@
             <a:r>
               <a:rPr lang="en-US" sz="4000" dirty="0" smtClean="0">
                 <a:solidFill>
-                  <a:schemeClr val="bg1"/>
+                  <a:sysClr val="windowText" lastClr="000000"/>
                 </a:solidFill>
                 <a:latin typeface="Avenir Light" charset="0"/>
                 <a:ea typeface="Avenir Light" charset="0"/>
@@ -3249,7 +3357,7 @@
             <a:r>
               <a:rPr lang="en-US" sz="4000" dirty="0">
                 <a:solidFill>
-                  <a:schemeClr val="bg1"/>
+                  <a:sysClr val="windowText" lastClr="000000"/>
                 </a:solidFill>
                 <a:latin typeface="Avenir Light" charset="0"/>
                 <a:ea typeface="Avenir Light" charset="0"/>
@@ -3260,7 +3368,7 @@
             <a:r>
               <a:rPr lang="en-US" sz="4000" dirty="0" smtClean="0">
                 <a:solidFill>
-                  <a:schemeClr val="bg1"/>
+                  <a:sysClr val="windowText" lastClr="000000"/>
                 </a:solidFill>
                 <a:latin typeface="Avenir Light" charset="0"/>
                 <a:ea typeface="Avenir Light" charset="0"/>
@@ -3270,7 +3378,7 @@
             </a:r>
             <a:endParaRPr lang="en-US" sz="4800" dirty="0">
               <a:solidFill>
-                <a:schemeClr val="bg1"/>
+                <a:sysClr val="windowText" lastClr="000000"/>
               </a:solidFill>
               <a:latin typeface="Avenir Light" charset="0"/>
               <a:ea typeface="Avenir Light" charset="0"/>
@@ -3287,23 +3395,64 @@
         </p:nvSpPr>
         <p:spPr>
           <a:xfrm>
-            <a:off x="17068800" y="5791201"/>
-            <a:ext cx="15330488" cy="8969829"/>
+            <a:off x="15849600" y="6583681"/>
+            <a:ext cx="16549688" cy="8969829"/>
           </a:xfrm>
           <a:prstGeom prst="rect">
             <a:avLst/>
           </a:prstGeom>
-          <a:solidFill>
-            <a:schemeClr val="tx2">
-              <a:lumMod val="75000"/>
-            </a:schemeClr>
-          </a:solidFill>
+          <a:noFill/>
+          <a:ln w="76200"/>
         </p:spPr>
+        <p:style>
+          <a:lnRef idx="2">
+            <a:schemeClr val="accent1"/>
+          </a:lnRef>
+          <a:fillRef idx="1">
+            <a:schemeClr val="lt1"/>
+          </a:fillRef>
+          <a:effectRef idx="0">
+            <a:schemeClr val="accent1"/>
+          </a:effectRef>
+          <a:fontRef idx="minor">
+            <a:schemeClr val="dk1"/>
+          </a:fontRef>
+        </p:style>
         <p:txBody>
           <a:bodyPr lIns="360000" rIns="360000">
             <a:noAutofit/>
           </a:bodyPr>
           <a:lstStyle/>
+          <a:p>
+            <a:pPr>
+              <a:lnSpc>
+                <a:spcPct val="150000"/>
+              </a:lnSpc>
+            </a:pPr>
+            <a:r>
+              <a:rPr lang="en-US" sz="5400" b="1" dirty="0" smtClean="0">
+                <a:solidFill>
+                  <a:schemeClr val="accent5">
+                    <a:lumMod val="50000"/>
+                  </a:schemeClr>
+                </a:solidFill>
+                <a:latin typeface="Avenir Light" charset="0"/>
+                <a:ea typeface="Avenir Light" charset="0"/>
+                <a:cs typeface="Avenir Light" charset="0"/>
+              </a:rPr>
+              <a:t>REQUIREMENTS</a:t>
+            </a:r>
+            <a:endParaRPr lang="en-US" sz="5400" b="1" dirty="0">
+              <a:solidFill>
+                <a:schemeClr val="accent5">
+                  <a:lumMod val="50000"/>
+                </a:schemeClr>
+              </a:solidFill>
+              <a:latin typeface="Avenir Light" charset="0"/>
+              <a:ea typeface="Avenir Light" charset="0"/>
+              <a:cs typeface="Avenir Light" charset="0"/>
+            </a:endParaRPr>
+          </a:p>
           <a:p>
             <a:pPr algn="just">
               <a:lnSpc>
@@ -3311,27 +3460,9 @@
               </a:lnSpc>
             </a:pPr>
             <a:r>
-              <a:rPr lang="en-US" sz="5400" dirty="0" smtClean="0">
-                <a:solidFill>
-                  <a:schemeClr val="bg1"/>
-                </a:solidFill>
-                <a:latin typeface="Avenir Light" charset="0"/>
-                <a:ea typeface="Avenir Light" charset="0"/>
-                <a:cs typeface="Avenir Light" charset="0"/>
-              </a:rPr>
-              <a:t>THE REQUIREMENTS</a:t>
-            </a:r>
-          </a:p>
-          <a:p>
-            <a:pPr algn="just">
-              <a:lnSpc>
-                <a:spcPct val="150000"/>
-              </a:lnSpc>
-            </a:pPr>
-            <a:r>
               <a:rPr lang="en-US" sz="4000" dirty="0" smtClean="0">
                 <a:solidFill>
-                  <a:schemeClr val="bg1"/>
+                  <a:sysClr val="windowText" lastClr="000000"/>
                 </a:solidFill>
                 <a:latin typeface="Avenir Light" charset="0"/>
                 <a:ea typeface="Avenir Light" charset="0"/>
@@ -3350,7 +3481,7 @@
             <a:r>
               <a:rPr lang="en-US" sz="4000" b="1" dirty="0" smtClean="0">
                 <a:solidFill>
-                  <a:schemeClr val="bg1"/>
+                  <a:sysClr val="windowText" lastClr="000000"/>
                 </a:solidFill>
                 <a:latin typeface="Avenir Heavy" charset="0"/>
                 <a:ea typeface="Avenir Heavy" charset="0"/>
@@ -3361,7 +3492,7 @@
             <a:r>
               <a:rPr lang="en-US" sz="4000" dirty="0" smtClean="0">
                 <a:solidFill>
-                  <a:schemeClr val="bg1"/>
+                  <a:sysClr val="windowText" lastClr="000000"/>
                 </a:solidFill>
                 <a:latin typeface="Avenir Light" charset="0"/>
                 <a:ea typeface="Avenir Light" charset="0"/>
@@ -3380,7 +3511,7 @@
             <a:r>
               <a:rPr lang="en-US" sz="4000" dirty="0" smtClean="0">
                 <a:solidFill>
-                  <a:schemeClr val="bg1"/>
+                  <a:sysClr val="windowText" lastClr="000000"/>
                 </a:solidFill>
                 <a:latin typeface="Avenir Light" charset="0"/>
                 <a:ea typeface="Avenir Light" charset="0"/>
@@ -3391,7 +3522,7 @@
             <a:r>
               <a:rPr lang="en-US" sz="4000" b="1" dirty="0" smtClean="0">
                 <a:solidFill>
-                  <a:schemeClr val="bg1"/>
+                  <a:sysClr val="windowText" lastClr="000000"/>
                 </a:solidFill>
                 <a:latin typeface="Avenir Light" charset="0"/>
                 <a:ea typeface="Avenir Light" charset="0"/>
@@ -3402,7 +3533,7 @@
             <a:r>
               <a:rPr lang="en-US" sz="4000" b="1" dirty="0" smtClean="0">
                 <a:solidFill>
-                  <a:schemeClr val="bg1"/>
+                  <a:sysClr val="windowText" lastClr="000000"/>
                 </a:solidFill>
                 <a:latin typeface="Avenir Heavy" charset="0"/>
                 <a:ea typeface="Avenir Heavy" charset="0"/>
@@ -3421,7 +3552,7 @@
             <a:r>
               <a:rPr lang="en-US" sz="4000" b="1" dirty="0" smtClean="0">
                 <a:solidFill>
-                  <a:schemeClr val="bg1"/>
+                  <a:sysClr val="windowText" lastClr="000000"/>
                 </a:solidFill>
                 <a:latin typeface="Avenir Heavy" charset="0"/>
                 <a:ea typeface="Avenir Heavy" charset="0"/>
@@ -3432,7 +3563,7 @@
             <a:r>
               <a:rPr lang="en-US" sz="4000" dirty="0" smtClean="0">
                 <a:solidFill>
-                  <a:schemeClr val="bg1"/>
+                  <a:sysClr val="windowText" lastClr="000000"/>
                 </a:solidFill>
                 <a:latin typeface="Avenir Light" charset="0"/>
                 <a:ea typeface="Avenir Light" charset="0"/>
@@ -3449,7 +3580,7 @@
             </a:pPr>
             <a:endParaRPr lang="en-US" sz="5400" dirty="0">
               <a:solidFill>
-                <a:schemeClr val="bg1"/>
+                <a:sysClr val="windowText" lastClr="000000"/>
               </a:solidFill>
               <a:latin typeface="Avenir Light" charset="0"/>
               <a:ea typeface="Avenir Light" charset="0"/>
@@ -3466,18 +3597,29 @@
         </p:nvSpPr>
         <p:spPr>
           <a:xfrm>
-            <a:off x="0" y="14761030"/>
-            <a:ext cx="17068800" cy="12511117"/>
+            <a:off x="0" y="15553510"/>
+            <a:ext cx="15849600" cy="12511117"/>
           </a:xfrm>
           <a:prstGeom prst="rect">
             <a:avLst/>
           </a:prstGeom>
-          <a:solidFill>
-            <a:schemeClr val="accent3">
-              <a:lumMod val="75000"/>
-            </a:schemeClr>
-          </a:solidFill>
+          <a:noFill/>
+          <a:ln w="76200"/>
         </p:spPr>
+        <p:style>
+          <a:lnRef idx="2">
+            <a:schemeClr val="accent1"/>
+          </a:lnRef>
+          <a:fillRef idx="1">
+            <a:schemeClr val="lt1"/>
+          </a:fillRef>
+          <a:effectRef idx="0">
+            <a:schemeClr val="accent1"/>
+          </a:effectRef>
+          <a:fontRef idx="minor">
+            <a:schemeClr val="dk1"/>
+          </a:fontRef>
+        </p:style>
         <p:txBody>
           <a:bodyPr wrap="square" lIns="360000" rIns="360000" rtlCol="0">
             <a:spAutoFit/>
@@ -3490,9 +3632,11 @@
               </a:lnSpc>
             </a:pPr>
             <a:r>
-              <a:rPr lang="en-US" sz="5400" dirty="0" smtClean="0">
-                <a:solidFill>
-                  <a:schemeClr val="bg1"/>
+              <a:rPr lang="en-US" sz="5400" b="1" dirty="0">
+                <a:solidFill>
+                  <a:schemeClr val="accent5">
+                    <a:lumMod val="50000"/>
+                  </a:schemeClr>
                 </a:solidFill>
                 <a:latin typeface="Avenir Light" charset="0"/>
                 <a:ea typeface="Avenir Light" charset="0"/>
@@ -3500,9 +3644,11 @@
               </a:rPr>
               <a:t>TECHNICAL CHALLANGES</a:t>
             </a:r>
-            <a:endParaRPr lang="en-US" sz="5400" dirty="0">
+            <a:endParaRPr lang="en-US" sz="5400" b="1" dirty="0">
               <a:solidFill>
-                <a:schemeClr val="bg1"/>
+                <a:schemeClr val="accent5">
+                  <a:lumMod val="50000"/>
+                </a:schemeClr>
               </a:solidFill>
               <a:latin typeface="Avenir Light" charset="0"/>
               <a:ea typeface="Avenir Light" charset="0"/>
@@ -3518,14 +3664,33 @@
             <a:r>
               <a:rPr lang="en-US" sz="4400" i="1" dirty="0" smtClean="0">
                 <a:solidFill>
-                  <a:schemeClr val="bg1"/>
+                  <a:sysClr val="windowText" lastClr="000000"/>
                 </a:solidFill>
                 <a:latin typeface="Avenir Light" charset="0"/>
                 <a:ea typeface="Avenir Light" charset="0"/>
                 <a:cs typeface="Avenir Light" charset="0"/>
               </a:rPr>
-              <a:t>Maximizing Frames per Second to allow Live play</a:t>
-            </a:r>
+              <a:t>Maximizing Frames per Second to allow Live </a:t>
+            </a:r>
+            <a:r>
+              <a:rPr lang="en-US" sz="4400" i="1" dirty="0" smtClean="0">
+                <a:solidFill>
+                  <a:sysClr val="windowText" lastClr="000000"/>
+                </a:solidFill>
+                <a:latin typeface="Avenir Light" charset="0"/>
+                <a:ea typeface="Avenir Light" charset="0"/>
+                <a:cs typeface="Avenir Light" charset="0"/>
+              </a:rPr>
+              <a:t>play.</a:t>
+            </a:r>
+            <a:endParaRPr lang="en-US" sz="4400" i="1" dirty="0" smtClean="0">
+              <a:solidFill>
+                <a:sysClr val="windowText" lastClr="000000"/>
+              </a:solidFill>
+              <a:latin typeface="Avenir Light" charset="0"/>
+              <a:ea typeface="Avenir Light" charset="0"/>
+              <a:cs typeface="Avenir Light" charset="0"/>
+            </a:endParaRPr>
           </a:p>
           <a:p>
             <a:pPr>
@@ -3536,7 +3701,7 @@
             <a:r>
               <a:rPr lang="en-US" sz="4000" dirty="0" smtClean="0">
                 <a:solidFill>
-                  <a:schemeClr val="bg1"/>
+                  <a:sysClr val="windowText" lastClr="000000"/>
                 </a:solidFill>
                 <a:latin typeface="Avenir Light" charset="0"/>
                 <a:ea typeface="Avenir Light" charset="0"/>
@@ -3556,7 +3721,7 @@
             <a:r>
               <a:rPr lang="en-US" sz="4000" dirty="0" smtClean="0">
                 <a:solidFill>
-                  <a:schemeClr val="bg1"/>
+                  <a:sysClr val="windowText" lastClr="000000"/>
                 </a:solidFill>
                 <a:latin typeface="Avenir Light" charset="0"/>
                 <a:ea typeface="Avenir Light" charset="0"/>
@@ -3567,7 +3732,7 @@
             <a:r>
               <a:rPr lang="mr-IN" sz="4000" dirty="0" smtClean="0">
                 <a:solidFill>
-                  <a:schemeClr val="bg1"/>
+                  <a:sysClr val="windowText" lastClr="000000"/>
                 </a:solidFill>
                 <a:latin typeface="Avenir Light" charset="0"/>
                 <a:ea typeface="Avenir Light" charset="0"/>
@@ -3578,28 +3743,50 @@
             <a:r>
               <a:rPr lang="en-US" sz="4000" dirty="0" smtClean="0">
                 <a:solidFill>
-                  <a:schemeClr val="bg1"/>
+                  <a:sysClr val="windowText" lastClr="000000"/>
                 </a:solidFill>
                 <a:latin typeface="Avenir Light" charset="0"/>
                 <a:ea typeface="Avenir Light" charset="0"/>
                 <a:cs typeface="Avenir Light" charset="0"/>
               </a:rPr>
-              <a:t> the process of projecting the images into a common image plane so that the shift, or </a:t>
+              <a:t> the process of projecting the images into a common image plane so that the </a:t>
             </a:r>
             <a:r>
               <a:rPr lang="en-US" sz="4000" dirty="0" smtClean="0">
                 <a:solidFill>
-                  <a:schemeClr val="bg1"/>
+                  <a:sysClr val="windowText" lastClr="000000"/>
                 </a:solidFill>
                 <a:latin typeface="Avenir Light" charset="0"/>
                 <a:ea typeface="Avenir Light" charset="0"/>
                 <a:cs typeface="Avenir Light" charset="0"/>
               </a:rPr>
-              <a:t>disparity, could be detected and the distance could be estimated.</a:t>
+              <a:t>shift can be </a:t>
+            </a:r>
+            <a:r>
+              <a:rPr lang="en-US" sz="4000" dirty="0">
+                <a:solidFill>
+                  <a:sysClr val="windowText" lastClr="000000"/>
+                </a:solidFill>
+                <a:latin typeface="Avenir Light" charset="0"/>
+                <a:ea typeface="Avenir Light" charset="0"/>
+                <a:cs typeface="Avenir Light" charset="0"/>
+              </a:rPr>
+              <a:t>m</a:t>
+            </a:r>
+            <a:r>
+              <a:rPr lang="en-US" sz="4000" dirty="0" smtClean="0">
+                <a:solidFill>
+                  <a:sysClr val="windowText" lastClr="000000"/>
+                </a:solidFill>
+                <a:latin typeface="Avenir Light" charset="0"/>
+                <a:ea typeface="Avenir Light" charset="0"/>
+                <a:cs typeface="Avenir Light" charset="0"/>
+              </a:rPr>
+              <a:t>easured.</a:t>
             </a:r>
             <a:endParaRPr lang="en-US" sz="4000" dirty="0" smtClean="0">
               <a:solidFill>
-                <a:schemeClr val="bg1"/>
+                <a:sysClr val="windowText" lastClr="000000"/>
               </a:solidFill>
               <a:latin typeface="Avenir Light" charset="0"/>
               <a:ea typeface="Avenir Light" charset="0"/>
@@ -3617,35 +3804,13 @@
             <a:r>
               <a:rPr lang="en-US" sz="4000" dirty="0" smtClean="0">
                 <a:solidFill>
-                  <a:schemeClr val="bg1"/>
+                  <a:sysClr val="windowText" lastClr="000000"/>
                 </a:solidFill>
                 <a:latin typeface="Avenir Light" charset="0"/>
                 <a:ea typeface="Avenir Light" charset="0"/>
                 <a:cs typeface="Avenir Light" charset="0"/>
               </a:rPr>
-              <a:t>Conversion </a:t>
-            </a:r>
-            <a:r>
-              <a:rPr lang="en-US" sz="4000" dirty="0" smtClean="0">
-                <a:solidFill>
-                  <a:schemeClr val="bg1"/>
-                </a:solidFill>
-                <a:latin typeface="Avenir Light" charset="0"/>
-                <a:ea typeface="Avenir Light" charset="0"/>
-                <a:cs typeface="Avenir Light" charset="0"/>
-              </a:rPr>
-              <a:t>of the RGB acquired image pairs </a:t>
-            </a:r>
-            <a:r>
-              <a:rPr lang="en-US" sz="4000" dirty="0" smtClean="0">
-                <a:solidFill>
-                  <a:schemeClr val="bg1"/>
-                </a:solidFill>
-                <a:latin typeface="Avenir Light" charset="0"/>
-                <a:ea typeface="Avenir Light" charset="0"/>
-                <a:cs typeface="Avenir Light" charset="0"/>
-              </a:rPr>
-              <a:t>to a chosen color-space in which the sticks tip are easily detected.</a:t>
+              <a:t>Conversion of the RGB acquired image pairs to a chosen color-space in which the sticks tip are easily detected.</a:t>
             </a:r>
           </a:p>
           <a:p>
@@ -3659,7 +3824,7 @@
             <a:r>
               <a:rPr lang="en-US" sz="4000" dirty="0" smtClean="0">
                 <a:solidFill>
-                  <a:schemeClr val="bg1"/>
+                  <a:sysClr val="windowText" lastClr="000000"/>
                 </a:solidFill>
                 <a:latin typeface="Avenir Light" charset="0"/>
                 <a:ea typeface="Avenir Light" charset="0"/>
@@ -3670,7 +3835,7 @@
             <a:r>
               <a:rPr lang="mr-IN" sz="4000" dirty="0" smtClean="0">
                 <a:solidFill>
-                  <a:schemeClr val="bg1"/>
+                  <a:sysClr val="windowText" lastClr="000000"/>
                 </a:solidFill>
                 <a:latin typeface="Avenir Light" charset="0"/>
                 <a:ea typeface="Avenir Light" charset="0"/>
@@ -3681,7 +3846,7 @@
             <a:r>
               <a:rPr lang="en-US" sz="4000" dirty="0" smtClean="0">
                 <a:solidFill>
-                  <a:schemeClr val="bg1"/>
+                  <a:sysClr val="windowText" lastClr="000000"/>
                 </a:solidFill>
                 <a:latin typeface="Avenir Light" charset="0"/>
                 <a:ea typeface="Avenir Light" charset="0"/>
@@ -3689,14 +3854,6 @@
               </a:rPr>
               <a:t> Image acquisition rate constrained by the cameras, and image processing rate constrained by the computer and chosen implementation.</a:t>
             </a:r>
-            <a:endParaRPr lang="en-US" sz="4000" dirty="0" smtClean="0">
-              <a:solidFill>
-                <a:schemeClr val="bg1"/>
-              </a:solidFill>
-              <a:latin typeface="Avenir Light" charset="0"/>
-              <a:ea typeface="Avenir Light" charset="0"/>
-              <a:cs typeface="Avenir Light" charset="0"/>
-            </a:endParaRPr>
           </a:p>
           <a:p>
             <a:pPr marL="914400" indent="-914400">
@@ -3708,7 +3865,7 @@
             </a:pPr>
             <a:endParaRPr lang="en-US" sz="4000" dirty="0" smtClean="0">
               <a:solidFill>
-                <a:schemeClr val="bg1"/>
+                <a:sysClr val="windowText" lastClr="000000"/>
               </a:solidFill>
               <a:latin typeface="Avenir Light" charset="0"/>
               <a:ea typeface="Avenir Light" charset="0"/>
@@ -3725,21 +3882,54 @@
         </p:nvSpPr>
         <p:spPr>
           <a:xfrm>
-            <a:off x="17068800" y="14761030"/>
-            <a:ext cx="15330488" cy="12511117"/>
+            <a:off x="15849600" y="15553510"/>
+            <a:ext cx="16549688" cy="12511117"/>
           </a:xfrm>
           <a:prstGeom prst="rect">
             <a:avLst/>
           </a:prstGeom>
-          <a:solidFill>
-            <a:srgbClr val="00B0F0"/>
-          </a:solidFill>
+          <a:noFill/>
+          <a:ln w="76200"/>
         </p:spPr>
+        <p:style>
+          <a:lnRef idx="2">
+            <a:schemeClr val="accent1"/>
+          </a:lnRef>
+          <a:fillRef idx="1">
+            <a:schemeClr val="lt1"/>
+          </a:fillRef>
+          <a:effectRef idx="0">
+            <a:schemeClr val="accent1"/>
+          </a:effectRef>
+          <a:fontRef idx="minor">
+            <a:schemeClr val="dk1"/>
+          </a:fontRef>
+        </p:style>
         <p:txBody>
           <a:bodyPr lIns="360000" rIns="360000">
             <a:noAutofit/>
           </a:bodyPr>
           <a:lstStyle/>
+          <a:p>
+            <a:pPr>
+              <a:lnSpc>
+                <a:spcPct val="150000"/>
+              </a:lnSpc>
+            </a:pPr>
+            <a:r>
+              <a:rPr lang="en-US" sz="5400" b="1" dirty="0">
+                <a:solidFill>
+                  <a:schemeClr val="accent5">
+                    <a:lumMod val="50000"/>
+                  </a:schemeClr>
+                </a:solidFill>
+                <a:latin typeface="Avenir Light" charset="0"/>
+                <a:ea typeface="Avenir Light" charset="0"/>
+                <a:cs typeface="Avenir Light" charset="0"/>
+              </a:rPr>
+              <a:t>SOLUTIONS</a:t>
+            </a:r>
+          </a:p>
           <a:p>
             <a:pPr algn="just">
               <a:lnSpc>
@@ -3747,27 +3937,9 @@
               </a:lnSpc>
             </a:pPr>
             <a:r>
-              <a:rPr lang="en-US" sz="5400" dirty="0" smtClean="0">
-                <a:solidFill>
-                  <a:schemeClr val="bg1"/>
-                </a:solidFill>
-                <a:latin typeface="Avenir Light" charset="0"/>
-                <a:ea typeface="Avenir Light" charset="0"/>
-                <a:cs typeface="Avenir Light" charset="0"/>
-              </a:rPr>
-              <a:t>SOLUTIONS</a:t>
-            </a:r>
-          </a:p>
-          <a:p>
-            <a:pPr algn="just">
-              <a:lnSpc>
-                <a:spcPct val="150000"/>
-              </a:lnSpc>
-            </a:pPr>
-            <a:r>
               <a:rPr lang="en-US" sz="4000" dirty="0" smtClean="0">
                 <a:solidFill>
-                  <a:schemeClr val="bg1"/>
+                  <a:sysClr val="windowText" lastClr="000000"/>
                 </a:solidFill>
                 <a:latin typeface="Avenir Light" charset="0"/>
                 <a:ea typeface="Avenir Light" charset="0"/>
@@ -3786,7 +3958,7 @@
             <a:r>
               <a:rPr lang="en-US" sz="4000" dirty="0" smtClean="0">
                 <a:solidFill>
-                  <a:schemeClr val="bg1"/>
+                  <a:sysClr val="windowText" lastClr="000000"/>
                 </a:solidFill>
                 <a:latin typeface="Avenir Light" charset="0"/>
                 <a:ea typeface="Avenir Light" charset="0"/>
@@ -3797,7 +3969,7 @@
             <a:r>
               <a:rPr lang="en-US" sz="4000" b="1" dirty="0" smtClean="0">
                 <a:solidFill>
-                  <a:schemeClr val="bg1"/>
+                  <a:sysClr val="windowText" lastClr="000000"/>
                 </a:solidFill>
                 <a:latin typeface="Avenir Heavy" charset="0"/>
                 <a:ea typeface="Avenir Heavy" charset="0"/>
@@ -3808,7 +3980,7 @@
             <a:r>
               <a:rPr lang="en-US" sz="4000" dirty="0" smtClean="0">
                 <a:solidFill>
-                  <a:schemeClr val="bg1"/>
+                  <a:sysClr val="windowText" lastClr="000000"/>
                 </a:solidFill>
                 <a:latin typeface="Avenir Heavy" charset="0"/>
                 <a:ea typeface="Avenir Heavy" charset="0"/>
@@ -3819,7 +3991,7 @@
             <a:r>
               <a:rPr lang="en-US" sz="4000" dirty="0" smtClean="0">
                 <a:solidFill>
-                  <a:schemeClr val="bg1"/>
+                  <a:sysClr val="windowText" lastClr="000000"/>
                 </a:solidFill>
                 <a:latin typeface="Avenir Light" charset="0"/>
                 <a:ea typeface="Avenir Light" charset="0"/>
@@ -3838,55 +4010,33 @@
             <a:r>
               <a:rPr lang="en-US" sz="4000" dirty="0" smtClean="0">
                 <a:solidFill>
-                  <a:schemeClr val="bg1"/>
+                  <a:sysClr val="windowText" lastClr="000000"/>
                 </a:solidFill>
                 <a:latin typeface="Avenir Light" charset="0"/>
                 <a:ea typeface="Avenir Light" charset="0"/>
                 <a:cs typeface="Avenir Light" charset="0"/>
               </a:rPr>
-              <a:t>The choice of color space used for detection takes into account the computational complexity of the conversion.</a:t>
-            </a:r>
-          </a:p>
-          <a:p>
-            <a:pPr marL="914400" indent="-914400" algn="just">
-              <a:lnSpc>
-                <a:spcPct val="150000"/>
-              </a:lnSpc>
-              <a:buAutoNum type="arabicPeriod"/>
-            </a:pPr>
+              <a:t>The choice of color space used for detection takes into account the computational complexity of the conversion</a:t>
+            </a:r>
             <a:r>
               <a:rPr lang="en-US" sz="4000" dirty="0" smtClean="0">
                 <a:solidFill>
-                  <a:schemeClr val="bg1"/>
+                  <a:sysClr val="windowText" lastClr="000000"/>
                 </a:solidFill>
                 <a:latin typeface="Avenir Light" charset="0"/>
                 <a:ea typeface="Avenir Light" charset="0"/>
                 <a:cs typeface="Avenir Light" charset="0"/>
               </a:rPr>
-              <a:t>Although most of the implementation was done in the MATLAB prototyping language, the program makes use of pre-compiled modules from the </a:t>
-            </a:r>
-            <a:r>
-              <a:rPr lang="en-US" sz="4000" dirty="0" err="1" smtClean="0">
-                <a:solidFill>
-                  <a:schemeClr val="bg1"/>
-                </a:solidFill>
-                <a:latin typeface="Avenir Light" charset="0"/>
-                <a:ea typeface="Avenir Light" charset="0"/>
-                <a:cs typeface="Avenir Light" charset="0"/>
-              </a:rPr>
-              <a:t>OpenCV</a:t>
-            </a:r>
-            <a:r>
-              <a:rPr lang="en-US" sz="4000" dirty="0" smtClean="0">
-                <a:solidFill>
-                  <a:schemeClr val="bg1"/>
-                </a:solidFill>
-                <a:latin typeface="Avenir Light" charset="0"/>
-                <a:ea typeface="Avenir Light" charset="0"/>
-                <a:cs typeface="Avenir Light" charset="0"/>
-              </a:rPr>
-              <a:t> libraries.</a:t>
-            </a:r>
+              <a:t>.</a:t>
+            </a:r>
+            <a:endParaRPr lang="en-US" sz="4000" dirty="0" smtClean="0">
+              <a:solidFill>
+                <a:sysClr val="windowText" lastClr="000000"/>
+              </a:solidFill>
+              <a:latin typeface="Avenir Light" charset="0"/>
+              <a:ea typeface="Avenir Light" charset="0"/>
+              <a:cs typeface="Avenir Light" charset="0"/>
+            </a:endParaRPr>
           </a:p>
           <a:p>
             <a:pPr algn="just">
@@ -3896,7 +4046,7 @@
             </a:pPr>
             <a:endParaRPr lang="en-US" sz="4000" dirty="0" smtClean="0">
               <a:solidFill>
-                <a:schemeClr val="bg1"/>
+                <a:sysClr val="windowText" lastClr="000000"/>
               </a:solidFill>
               <a:latin typeface="Avenir Light" charset="0"/>
               <a:ea typeface="Avenir Light" charset="0"/>
@@ -3909,9 +4059,53 @@
                 <a:spcPct val="150000"/>
               </a:lnSpc>
             </a:pPr>
+            <a:r>
+              <a:rPr lang="en-US" sz="4000" dirty="0" smtClean="0">
+                <a:solidFill>
+                  <a:sysClr val="windowText" lastClr="000000"/>
+                </a:solidFill>
+                <a:latin typeface="Avenir Light" charset="0"/>
+                <a:ea typeface="Avenir Light" charset="0"/>
+                <a:cs typeface="Avenir Light" charset="0"/>
+              </a:rPr>
+              <a:t>* YC</a:t>
+            </a:r>
+            <a:r>
+              <a:rPr lang="en-US" sz="4000" baseline="-25000" dirty="0" smtClean="0">
+                <a:solidFill>
+                  <a:sysClr val="windowText" lastClr="000000"/>
+                </a:solidFill>
+                <a:latin typeface="Avenir Light" charset="0"/>
+                <a:ea typeface="Avenir Light" charset="0"/>
+                <a:cs typeface="Avenir Light" charset="0"/>
+              </a:rPr>
+              <a:t>B</a:t>
+            </a:r>
+            <a:r>
+              <a:rPr lang="en-US" sz="4000" dirty="0" smtClean="0">
+                <a:solidFill>
+                  <a:sysClr val="windowText" lastClr="000000"/>
+                </a:solidFill>
+                <a:latin typeface="Avenir Light" charset="0"/>
+                <a:ea typeface="Avenir Light" charset="0"/>
+                <a:cs typeface="Avenir Light" charset="0"/>
+              </a:rPr>
+              <a:t>C</a:t>
+            </a:r>
+            <a:r>
+              <a:rPr lang="en-US" sz="4000" baseline="-25000" dirty="0" smtClean="0">
+                <a:solidFill>
+                  <a:sysClr val="windowText" lastClr="000000"/>
+                </a:solidFill>
+                <a:latin typeface="Avenir Light" charset="0"/>
+                <a:ea typeface="Avenir Light" charset="0"/>
+                <a:cs typeface="Avenir Light" charset="0"/>
+              </a:rPr>
+              <a:t>R</a:t>
+            </a:r>
             <a:endParaRPr lang="en-US" sz="4000" dirty="0">
               <a:solidFill>
-                <a:schemeClr val="bg1"/>
+                <a:sysClr val="windowText" lastClr="000000"/>
               </a:solidFill>
               <a:latin typeface="Avenir Light" charset="0"/>
               <a:ea typeface="Avenir Light" charset="0"/>
@@ -3928,7 +4122,7 @@
         </p:nvSpPr>
         <p:spPr>
           <a:xfrm>
-            <a:off x="6606792" y="30327600"/>
+            <a:off x="6280220" y="28486365"/>
             <a:ext cx="20924016" cy="1877437"/>
           </a:xfrm>
           <a:prstGeom prst="rect">
@@ -3944,9 +4138,9 @@
           <a:p>
             <a:pPr algn="ctr"/>
             <a:r>
-              <a:rPr lang="en-US" sz="11600" dirty="0" smtClean="0">
-                <a:solidFill>
-                  <a:schemeClr val="accent1">
+              <a:rPr lang="en-US" sz="11600" b="1" dirty="0" smtClean="0">
+                <a:solidFill>
+                  <a:schemeClr val="accent5">
                     <a:lumMod val="50000"/>
                   </a:schemeClr>
                 </a:solidFill>
@@ -3956,9 +4150,9 @@
               </a:rPr>
               <a:t>The System</a:t>
             </a:r>
-            <a:endParaRPr lang="en-US" sz="6000" dirty="0">
+            <a:endParaRPr lang="en-US" sz="6000" b="1" dirty="0">
               <a:solidFill>
-                <a:schemeClr val="accent1">
+                <a:schemeClr val="accent5">
                   <a:lumMod val="50000"/>
                 </a:schemeClr>
               </a:solidFill>
@@ -3987,6 +4181,30 @@
           <a:xfrm>
             <a:off x="20526510" y="0"/>
             <a:ext cx="11872777" cy="2307771"/>
+          </a:xfrm>
+          <a:prstGeom prst="rect">
+            <a:avLst/>
+          </a:prstGeom>
+        </p:spPr>
+      </p:pic>
+      <p:pic>
+        <p:nvPicPr>
+          <p:cNvPr id="2" name="Picture 1"/>
+          <p:cNvPicPr>
+            <a:picLocks noChangeAspect="1"/>
+          </p:cNvPicPr>
+          <p:nvPr/>
+        </p:nvPicPr>
+        <p:blipFill>
+          <a:blip r:embed="rId3"/>
+          <a:stretch>
+            <a:fillRect/>
+          </a:stretch>
+        </p:blipFill>
+        <p:spPr>
+          <a:xfrm>
+            <a:off x="701537" y="30363802"/>
+            <a:ext cx="30773426" cy="7659761"/>
           </a:xfrm>
           <a:prstGeom prst="rect">
             <a:avLst/>

</xml_diff>